<commit_message>
Corrections Dunod Chap 10
</commit_message>
<xml_diff>
--- a/img/schema_fonction.pptx
+++ b/img/schema_fonction.pptx
@@ -1,19 +1,114 @@
 
 <file path=ppt/presentation.xml><?xml version="1.0" encoding="utf-8"?>
-<p:presentation xmlns:a="http://schemas.openxmlformats.org/drawingml/2006/main" xmlns:p="http://schemas.openxmlformats.org/presentationml/2006/main" xmlns:r="http://schemas.openxmlformats.org/officeDocument/2006/relationships" xmlns:p14="http://schemas.microsoft.com/office/powerpoint/2010/main" xmlns:p15="http://schemas.microsoft.com/office/powerpoint/2012/main" xmlns:mc="http://schemas.openxmlformats.org/markup-compatibility/2006">
+<p:presentation xmlns:a="http://schemas.openxmlformats.org/drawingml/2006/main" xmlns:r="http://schemas.openxmlformats.org/officeDocument/2006/relationships" xmlns:p="http://schemas.openxmlformats.org/presentationml/2006/main">
   <p:sldMasterIdLst>
-    <p:sldMasterId id="2147483648" r:id="rId2"/>
+    <p:sldMasterId id="2147483648" r:id="rId1"/>
   </p:sldMasterIdLst>
   <p:sldIdLst>
-    <p:sldId id="256" r:id="rId3"/>
+    <p:sldId id="256" r:id="rId2"/>
   </p:sldIdLst>
-  <p:sldSz cx="9144000" cy="6858000"/>
-  <p:notesSz cx="7559675" cy="10691812"/>
+  <p:sldSz cx="9144000" cy="6858000" type="screen4x3"/>
+  <p:notesSz cx="7559675" cy="10691813"/>
+  <p:defaultTextStyle>
+    <a:defPPr>
+      <a:defRPr lang="fr-FR"/>
+    </a:defPPr>
+    <a:lvl1pPr marL="0" algn="l" defTabSz="914400" rtl="0" eaLnBrk="1" latinLnBrk="0" hangingPunct="1">
+      <a:defRPr sz="1800" kern="1200">
+        <a:solidFill>
+          <a:schemeClr val="tx1"/>
+        </a:solidFill>
+        <a:latin typeface="+mn-lt"/>
+        <a:ea typeface="+mn-ea"/>
+        <a:cs typeface="+mn-cs"/>
+      </a:defRPr>
+    </a:lvl1pPr>
+    <a:lvl2pPr marL="457200" algn="l" defTabSz="914400" rtl="0" eaLnBrk="1" latinLnBrk="0" hangingPunct="1">
+      <a:defRPr sz="1800" kern="1200">
+        <a:solidFill>
+          <a:schemeClr val="tx1"/>
+        </a:solidFill>
+        <a:latin typeface="+mn-lt"/>
+        <a:ea typeface="+mn-ea"/>
+        <a:cs typeface="+mn-cs"/>
+      </a:defRPr>
+    </a:lvl2pPr>
+    <a:lvl3pPr marL="914400" algn="l" defTabSz="914400" rtl="0" eaLnBrk="1" latinLnBrk="0" hangingPunct="1">
+      <a:defRPr sz="1800" kern="1200">
+        <a:solidFill>
+          <a:schemeClr val="tx1"/>
+        </a:solidFill>
+        <a:latin typeface="+mn-lt"/>
+        <a:ea typeface="+mn-ea"/>
+        <a:cs typeface="+mn-cs"/>
+      </a:defRPr>
+    </a:lvl3pPr>
+    <a:lvl4pPr marL="1371600" algn="l" defTabSz="914400" rtl="0" eaLnBrk="1" latinLnBrk="0" hangingPunct="1">
+      <a:defRPr sz="1800" kern="1200">
+        <a:solidFill>
+          <a:schemeClr val="tx1"/>
+        </a:solidFill>
+        <a:latin typeface="+mn-lt"/>
+        <a:ea typeface="+mn-ea"/>
+        <a:cs typeface="+mn-cs"/>
+      </a:defRPr>
+    </a:lvl4pPr>
+    <a:lvl5pPr marL="1828800" algn="l" defTabSz="914400" rtl="0" eaLnBrk="1" latinLnBrk="0" hangingPunct="1">
+      <a:defRPr sz="1800" kern="1200">
+        <a:solidFill>
+          <a:schemeClr val="tx1"/>
+        </a:solidFill>
+        <a:latin typeface="+mn-lt"/>
+        <a:ea typeface="+mn-ea"/>
+        <a:cs typeface="+mn-cs"/>
+      </a:defRPr>
+    </a:lvl5pPr>
+    <a:lvl6pPr marL="2286000" algn="l" defTabSz="914400" rtl="0" eaLnBrk="1" latinLnBrk="0" hangingPunct="1">
+      <a:defRPr sz="1800" kern="1200">
+        <a:solidFill>
+          <a:schemeClr val="tx1"/>
+        </a:solidFill>
+        <a:latin typeface="+mn-lt"/>
+        <a:ea typeface="+mn-ea"/>
+        <a:cs typeface="+mn-cs"/>
+      </a:defRPr>
+    </a:lvl6pPr>
+    <a:lvl7pPr marL="2743200" algn="l" defTabSz="914400" rtl="0" eaLnBrk="1" latinLnBrk="0" hangingPunct="1">
+      <a:defRPr sz="1800" kern="1200">
+        <a:solidFill>
+          <a:schemeClr val="tx1"/>
+        </a:solidFill>
+        <a:latin typeface="+mn-lt"/>
+        <a:ea typeface="+mn-ea"/>
+        <a:cs typeface="+mn-cs"/>
+      </a:defRPr>
+    </a:lvl7pPr>
+    <a:lvl8pPr marL="3200400" algn="l" defTabSz="914400" rtl="0" eaLnBrk="1" latinLnBrk="0" hangingPunct="1">
+      <a:defRPr sz="1800" kern="1200">
+        <a:solidFill>
+          <a:schemeClr val="tx1"/>
+        </a:solidFill>
+        <a:latin typeface="+mn-lt"/>
+        <a:ea typeface="+mn-ea"/>
+        <a:cs typeface="+mn-cs"/>
+      </a:defRPr>
+    </a:lvl8pPr>
+    <a:lvl9pPr marL="3657600" algn="l" defTabSz="914400" rtl="0" eaLnBrk="1" latinLnBrk="0" hangingPunct="1">
+      <a:defRPr sz="1800" kern="1200">
+        <a:solidFill>
+          <a:schemeClr val="tx1"/>
+        </a:solidFill>
+        <a:latin typeface="+mn-lt"/>
+        <a:ea typeface="+mn-ea"/>
+        <a:cs typeface="+mn-cs"/>
+      </a:defRPr>
+    </a:lvl9pPr>
+  </p:defaultTextStyle>
 </p:presentation>
 </file>
 
 <file path=ppt/slideLayouts/slideLayout1.xml><?xml version="1.0" encoding="utf-8"?>
-<p:sldLayout xmlns:a="http://schemas.openxmlformats.org/drawingml/2006/main" xmlns:p="http://schemas.openxmlformats.org/presentationml/2006/main" xmlns:r="http://schemas.openxmlformats.org/officeDocument/2006/relationships" xmlns:p14="http://schemas.microsoft.com/office/powerpoint/2010/main" xmlns:p15="http://schemas.microsoft.com/office/powerpoint/2012/main" xmlns:mc="http://schemas.openxmlformats.org/markup-compatibility/2006" type="blank" preserve="1">
+<p:sldLayout xmlns:a="http://schemas.openxmlformats.org/drawingml/2006/main" xmlns:r="http://schemas.openxmlformats.org/officeDocument/2006/relationships" xmlns:p="http://schemas.openxmlformats.org/presentationml/2006/main" type="blank" preserve="1">
   <p:cSld name="Blank Slide">
     <p:spTree>
       <p:nvGrpSpPr>
@@ -31,11 +126,14 @@
       </p:grpSpPr>
     </p:spTree>
   </p:cSld>
+  <p:clrMapOvr>
+    <a:masterClrMapping/>
+  </p:clrMapOvr>
 </p:sldLayout>
 </file>
 
 <file path=ppt/slideLayouts/slideLayout10.xml><?xml version="1.0" encoding="utf-8"?>
-<p:sldLayout xmlns:a="http://schemas.openxmlformats.org/drawingml/2006/main" xmlns:p="http://schemas.openxmlformats.org/presentationml/2006/main" xmlns:r="http://schemas.openxmlformats.org/officeDocument/2006/relationships" xmlns:p14="http://schemas.microsoft.com/office/powerpoint/2010/main" xmlns:p15="http://schemas.microsoft.com/office/powerpoint/2012/main" xmlns:mc="http://schemas.openxmlformats.org/markup-compatibility/2006" type="objOverTx" preserve="1">
+<p:sldLayout xmlns:a="http://schemas.openxmlformats.org/drawingml/2006/main" xmlns:r="http://schemas.openxmlformats.org/officeDocument/2006/relationships" xmlns:p="http://schemas.openxmlformats.org/presentationml/2006/main" type="objOverTx" preserve="1">
   <p:cSld name="Title, Content over Content">
     <p:spTree>
       <p:nvGrpSpPr>
@@ -71,10 +169,11 @@
           </a:prstGeom>
         </p:spPr>
         <p:txBody>
-          <a:bodyPr lIns="0" rIns="0" tIns="0" bIns="0" anchor="ctr"/>
+          <a:bodyPr lIns="0" tIns="0" rIns="0" bIns="0" anchor="ctr"/>
+          <a:lstStyle/>
           <a:p>
             <a:pPr algn="ctr"/>
-            <a:endParaRPr b="0" lang="fr-FR" sz="4400" spc="-1" strike="noStrike">
+            <a:endParaRPr lang="fr-FR" sz="4400" b="0" strike="noStrike" spc="-1">
               <a:latin typeface="Arial"/>
             </a:endParaRPr>
           </a:p>
@@ -100,11 +199,12 @@
           </a:prstGeom>
         </p:spPr>
         <p:txBody>
-          <a:bodyPr lIns="0" rIns="0" tIns="0" bIns="0">
+          <a:bodyPr lIns="0" tIns="0" rIns="0" bIns="0">
             <a:normAutofit/>
           </a:bodyPr>
-          <a:p>
-            <a:endParaRPr b="0" lang="fr-FR" sz="3200" spc="-1" strike="noStrike">
+          <a:lstStyle/>
+          <a:p>
+            <a:endParaRPr lang="fr-FR" sz="3200" b="0" strike="noStrike" spc="-1">
               <a:latin typeface="Arial"/>
             </a:endParaRPr>
           </a:p>
@@ -130,11 +230,12 @@
           </a:prstGeom>
         </p:spPr>
         <p:txBody>
-          <a:bodyPr lIns="0" rIns="0" tIns="0" bIns="0">
+          <a:bodyPr lIns="0" tIns="0" rIns="0" bIns="0">
             <a:normAutofit/>
           </a:bodyPr>
-          <a:p>
-            <a:endParaRPr b="0" lang="fr-FR" sz="3200" spc="-1" strike="noStrike">
+          <a:lstStyle/>
+          <a:p>
+            <a:endParaRPr lang="fr-FR" sz="3200" b="0" strike="noStrike" spc="-1">
               <a:latin typeface="Arial"/>
             </a:endParaRPr>
           </a:p>
@@ -142,11 +243,14 @@
       </p:sp>
     </p:spTree>
   </p:cSld>
+  <p:clrMapOvr>
+    <a:masterClrMapping/>
+  </p:clrMapOvr>
 </p:sldLayout>
 </file>
 
 <file path=ppt/slideLayouts/slideLayout11.xml><?xml version="1.0" encoding="utf-8"?>
-<p:sldLayout xmlns:a="http://schemas.openxmlformats.org/drawingml/2006/main" xmlns:p="http://schemas.openxmlformats.org/presentationml/2006/main" xmlns:r="http://schemas.openxmlformats.org/officeDocument/2006/relationships" xmlns:p14="http://schemas.microsoft.com/office/powerpoint/2010/main" xmlns:p15="http://schemas.microsoft.com/office/powerpoint/2012/main" xmlns:mc="http://schemas.openxmlformats.org/markup-compatibility/2006" type="fourObj" preserve="1">
+<p:sldLayout xmlns:a="http://schemas.openxmlformats.org/drawingml/2006/main" xmlns:r="http://schemas.openxmlformats.org/officeDocument/2006/relationships" xmlns:p="http://schemas.openxmlformats.org/presentationml/2006/main" type="fourObj" preserve="1">
   <p:cSld name="Title, 4 Content">
     <p:spTree>
       <p:nvGrpSpPr>
@@ -182,10 +286,11 @@
           </a:prstGeom>
         </p:spPr>
         <p:txBody>
-          <a:bodyPr lIns="0" rIns="0" tIns="0" bIns="0" anchor="ctr"/>
+          <a:bodyPr lIns="0" tIns="0" rIns="0" bIns="0" anchor="ctr"/>
+          <a:lstStyle/>
           <a:p>
             <a:pPr algn="ctr"/>
-            <a:endParaRPr b="0" lang="fr-FR" sz="4400" spc="-1" strike="noStrike">
+            <a:endParaRPr lang="fr-FR" sz="4400" b="0" strike="noStrike" spc="-1">
               <a:latin typeface="Arial"/>
             </a:endParaRPr>
           </a:p>
@@ -211,11 +316,12 @@
           </a:prstGeom>
         </p:spPr>
         <p:txBody>
-          <a:bodyPr lIns="0" rIns="0" tIns="0" bIns="0">
+          <a:bodyPr lIns="0" tIns="0" rIns="0" bIns="0">
             <a:normAutofit/>
           </a:bodyPr>
-          <a:p>
-            <a:endParaRPr b="0" lang="fr-FR" sz="3200" spc="-1" strike="noStrike">
+          <a:lstStyle/>
+          <a:p>
+            <a:endParaRPr lang="fr-FR" sz="3200" b="0" strike="noStrike" spc="-1">
               <a:latin typeface="Arial"/>
             </a:endParaRPr>
           </a:p>
@@ -241,11 +347,12 @@
           </a:prstGeom>
         </p:spPr>
         <p:txBody>
-          <a:bodyPr lIns="0" rIns="0" tIns="0" bIns="0">
+          <a:bodyPr lIns="0" tIns="0" rIns="0" bIns="0">
             <a:normAutofit/>
           </a:bodyPr>
-          <a:p>
-            <a:endParaRPr b="0" lang="fr-FR" sz="3200" spc="-1" strike="noStrike">
+          <a:lstStyle/>
+          <a:p>
+            <a:endParaRPr lang="fr-FR" sz="3200" b="0" strike="noStrike" spc="-1">
               <a:latin typeface="Arial"/>
             </a:endParaRPr>
           </a:p>
@@ -271,11 +378,12 @@
           </a:prstGeom>
         </p:spPr>
         <p:txBody>
-          <a:bodyPr lIns="0" rIns="0" tIns="0" bIns="0">
+          <a:bodyPr lIns="0" tIns="0" rIns="0" bIns="0">
             <a:normAutofit/>
           </a:bodyPr>
-          <a:p>
-            <a:endParaRPr b="0" lang="fr-FR" sz="3200" spc="-1" strike="noStrike">
+          <a:lstStyle/>
+          <a:p>
+            <a:endParaRPr lang="fr-FR" sz="3200" b="0" strike="noStrike" spc="-1">
               <a:latin typeface="Arial"/>
             </a:endParaRPr>
           </a:p>
@@ -301,11 +409,12 @@
           </a:prstGeom>
         </p:spPr>
         <p:txBody>
-          <a:bodyPr lIns="0" rIns="0" tIns="0" bIns="0">
+          <a:bodyPr lIns="0" tIns="0" rIns="0" bIns="0">
             <a:normAutofit/>
           </a:bodyPr>
-          <a:p>
-            <a:endParaRPr b="0" lang="fr-FR" sz="3200" spc="-1" strike="noStrike">
+          <a:lstStyle/>
+          <a:p>
+            <a:endParaRPr lang="fr-FR" sz="3200" b="0" strike="noStrike" spc="-1">
               <a:latin typeface="Arial"/>
             </a:endParaRPr>
           </a:p>
@@ -313,11 +422,14 @@
       </p:sp>
     </p:spTree>
   </p:cSld>
+  <p:clrMapOvr>
+    <a:masterClrMapping/>
+  </p:clrMapOvr>
 </p:sldLayout>
 </file>
 
 <file path=ppt/slideLayouts/slideLayout12.xml><?xml version="1.0" encoding="utf-8"?>
-<p:sldLayout xmlns:a="http://schemas.openxmlformats.org/drawingml/2006/main" xmlns:p="http://schemas.openxmlformats.org/presentationml/2006/main" xmlns:r="http://schemas.openxmlformats.org/officeDocument/2006/relationships" xmlns:p14="http://schemas.microsoft.com/office/powerpoint/2010/main" xmlns:p15="http://schemas.microsoft.com/office/powerpoint/2012/main" xmlns:mc="http://schemas.openxmlformats.org/markup-compatibility/2006" type="blank" preserve="1">
+<p:sldLayout xmlns:a="http://schemas.openxmlformats.org/drawingml/2006/main" xmlns:r="http://schemas.openxmlformats.org/officeDocument/2006/relationships" xmlns:p="http://schemas.openxmlformats.org/presentationml/2006/main" type="blank" preserve="1">
   <p:cSld name="Title, 6 Content">
     <p:spTree>
       <p:nvGrpSpPr>
@@ -353,10 +465,11 @@
           </a:prstGeom>
         </p:spPr>
         <p:txBody>
-          <a:bodyPr lIns="0" rIns="0" tIns="0" bIns="0" anchor="ctr"/>
+          <a:bodyPr lIns="0" tIns="0" rIns="0" bIns="0" anchor="ctr"/>
+          <a:lstStyle/>
           <a:p>
             <a:pPr algn="ctr"/>
-            <a:endParaRPr b="0" lang="fr-FR" sz="4400" spc="-1" strike="noStrike">
+            <a:endParaRPr lang="fr-FR" sz="4400" b="0" strike="noStrike" spc="-1">
               <a:latin typeface="Arial"/>
             </a:endParaRPr>
           </a:p>
@@ -382,11 +495,12 @@
           </a:prstGeom>
         </p:spPr>
         <p:txBody>
-          <a:bodyPr lIns="0" rIns="0" tIns="0" bIns="0">
+          <a:bodyPr lIns="0" tIns="0" rIns="0" bIns="0">
             <a:normAutofit/>
           </a:bodyPr>
-          <a:p>
-            <a:endParaRPr b="0" lang="fr-FR" sz="3200" spc="-1" strike="noStrike">
+          <a:lstStyle/>
+          <a:p>
+            <a:endParaRPr lang="fr-FR" sz="3200" b="0" strike="noStrike" spc="-1">
               <a:latin typeface="Arial"/>
             </a:endParaRPr>
           </a:p>
@@ -412,11 +526,12 @@
           </a:prstGeom>
         </p:spPr>
         <p:txBody>
-          <a:bodyPr lIns="0" rIns="0" tIns="0" bIns="0">
+          <a:bodyPr lIns="0" tIns="0" rIns="0" bIns="0">
             <a:normAutofit/>
           </a:bodyPr>
-          <a:p>
-            <a:endParaRPr b="0" lang="fr-FR" sz="3200" spc="-1" strike="noStrike">
+          <a:lstStyle/>
+          <a:p>
+            <a:endParaRPr lang="fr-FR" sz="3200" b="0" strike="noStrike" spc="-1">
               <a:latin typeface="Arial"/>
             </a:endParaRPr>
           </a:p>
@@ -442,11 +557,12 @@
           </a:prstGeom>
         </p:spPr>
         <p:txBody>
-          <a:bodyPr lIns="0" rIns="0" tIns="0" bIns="0">
+          <a:bodyPr lIns="0" tIns="0" rIns="0" bIns="0">
             <a:normAutofit/>
           </a:bodyPr>
-          <a:p>
-            <a:endParaRPr b="0" lang="fr-FR" sz="3200" spc="-1" strike="noStrike">
+          <a:lstStyle/>
+          <a:p>
+            <a:endParaRPr lang="fr-FR" sz="3200" b="0" strike="noStrike" spc="-1">
               <a:latin typeface="Arial"/>
             </a:endParaRPr>
           </a:p>
@@ -472,11 +588,12 @@
           </a:prstGeom>
         </p:spPr>
         <p:txBody>
-          <a:bodyPr lIns="0" rIns="0" tIns="0" bIns="0">
+          <a:bodyPr lIns="0" tIns="0" rIns="0" bIns="0">
             <a:normAutofit/>
           </a:bodyPr>
-          <a:p>
-            <a:endParaRPr b="0" lang="fr-FR" sz="3200" spc="-1" strike="noStrike">
+          <a:lstStyle/>
+          <a:p>
+            <a:endParaRPr lang="fr-FR" sz="3200" b="0" strike="noStrike" spc="-1">
               <a:latin typeface="Arial"/>
             </a:endParaRPr>
           </a:p>
@@ -502,11 +619,12 @@
           </a:prstGeom>
         </p:spPr>
         <p:txBody>
-          <a:bodyPr lIns="0" rIns="0" tIns="0" bIns="0">
+          <a:bodyPr lIns="0" tIns="0" rIns="0" bIns="0">
             <a:normAutofit/>
           </a:bodyPr>
-          <a:p>
-            <a:endParaRPr b="0" lang="fr-FR" sz="3200" spc="-1" strike="noStrike">
+          <a:lstStyle/>
+          <a:p>
+            <a:endParaRPr lang="fr-FR" sz="3200" b="0" strike="noStrike" spc="-1">
               <a:latin typeface="Arial"/>
             </a:endParaRPr>
           </a:p>
@@ -532,11 +650,12 @@
           </a:prstGeom>
         </p:spPr>
         <p:txBody>
-          <a:bodyPr lIns="0" rIns="0" tIns="0" bIns="0">
+          <a:bodyPr lIns="0" tIns="0" rIns="0" bIns="0">
             <a:normAutofit/>
           </a:bodyPr>
-          <a:p>
-            <a:endParaRPr b="0" lang="fr-FR" sz="3200" spc="-1" strike="noStrike">
+          <a:lstStyle/>
+          <a:p>
+            <a:endParaRPr lang="fr-FR" sz="3200" b="0" strike="noStrike" spc="-1">
               <a:latin typeface="Arial"/>
             </a:endParaRPr>
           </a:p>
@@ -544,11 +663,14 @@
       </p:sp>
     </p:spTree>
   </p:cSld>
+  <p:clrMapOvr>
+    <a:masterClrMapping/>
+  </p:clrMapOvr>
 </p:sldLayout>
 </file>
 
 <file path=ppt/slideLayouts/slideLayout2.xml><?xml version="1.0" encoding="utf-8"?>
-<p:sldLayout xmlns:a="http://schemas.openxmlformats.org/drawingml/2006/main" xmlns:p="http://schemas.openxmlformats.org/presentationml/2006/main" xmlns:r="http://schemas.openxmlformats.org/officeDocument/2006/relationships" xmlns:p14="http://schemas.microsoft.com/office/powerpoint/2010/main" xmlns:p15="http://schemas.microsoft.com/office/powerpoint/2012/main" xmlns:mc="http://schemas.openxmlformats.org/markup-compatibility/2006" type="tx" preserve="1">
+<p:sldLayout xmlns:a="http://schemas.openxmlformats.org/drawingml/2006/main" xmlns:r="http://schemas.openxmlformats.org/officeDocument/2006/relationships" xmlns:p="http://schemas.openxmlformats.org/presentationml/2006/main" type="tx" preserve="1">
   <p:cSld name="Title Slide">
     <p:spTree>
       <p:nvGrpSpPr>
@@ -584,10 +706,11 @@
           </a:prstGeom>
         </p:spPr>
         <p:txBody>
-          <a:bodyPr lIns="0" rIns="0" tIns="0" bIns="0" anchor="ctr"/>
+          <a:bodyPr lIns="0" tIns="0" rIns="0" bIns="0" anchor="ctr"/>
+          <a:lstStyle/>
           <a:p>
             <a:pPr algn="ctr"/>
-            <a:endParaRPr b="0" lang="fr-FR" sz="4400" spc="-1" strike="noStrike">
+            <a:endParaRPr lang="fr-FR" sz="4400" b="0" strike="noStrike" spc="-1">
               <a:latin typeface="Arial"/>
             </a:endParaRPr>
           </a:p>
@@ -613,10 +736,11 @@
           </a:prstGeom>
         </p:spPr>
         <p:txBody>
-          <a:bodyPr lIns="0" rIns="0" tIns="0" bIns="0" anchor="ctr"/>
+          <a:bodyPr lIns="0" tIns="0" rIns="0" bIns="0" anchor="ctr"/>
+          <a:lstStyle/>
           <a:p>
             <a:pPr algn="ctr"/>
-            <a:endParaRPr b="0" lang="fr-FR" sz="3200" spc="-1" strike="noStrike">
+            <a:endParaRPr lang="fr-FR" sz="3200" b="0" strike="noStrike" spc="-1">
               <a:latin typeface="Arial"/>
             </a:endParaRPr>
           </a:p>
@@ -624,11 +748,14 @@
       </p:sp>
     </p:spTree>
   </p:cSld>
+  <p:clrMapOvr>
+    <a:masterClrMapping/>
+  </p:clrMapOvr>
 </p:sldLayout>
 </file>
 
 <file path=ppt/slideLayouts/slideLayout3.xml><?xml version="1.0" encoding="utf-8"?>
-<p:sldLayout xmlns:a="http://schemas.openxmlformats.org/drawingml/2006/main" xmlns:p="http://schemas.openxmlformats.org/presentationml/2006/main" xmlns:r="http://schemas.openxmlformats.org/officeDocument/2006/relationships" xmlns:p14="http://schemas.microsoft.com/office/powerpoint/2010/main" xmlns:p15="http://schemas.microsoft.com/office/powerpoint/2012/main" xmlns:mc="http://schemas.openxmlformats.org/markup-compatibility/2006" type="obj" preserve="1">
+<p:sldLayout xmlns:a="http://schemas.openxmlformats.org/drawingml/2006/main" xmlns:r="http://schemas.openxmlformats.org/officeDocument/2006/relationships" xmlns:p="http://schemas.openxmlformats.org/presentationml/2006/main" type="obj" preserve="1">
   <p:cSld name="Title, Content">
     <p:spTree>
       <p:nvGrpSpPr>
@@ -664,10 +791,11 @@
           </a:prstGeom>
         </p:spPr>
         <p:txBody>
-          <a:bodyPr lIns="0" rIns="0" tIns="0" bIns="0" anchor="ctr"/>
+          <a:bodyPr lIns="0" tIns="0" rIns="0" bIns="0" anchor="ctr"/>
+          <a:lstStyle/>
           <a:p>
             <a:pPr algn="ctr"/>
-            <a:endParaRPr b="0" lang="fr-FR" sz="4400" spc="-1" strike="noStrike">
+            <a:endParaRPr lang="fr-FR" sz="4400" b="0" strike="noStrike" spc="-1">
               <a:latin typeface="Arial"/>
             </a:endParaRPr>
           </a:p>
@@ -693,11 +821,12 @@
           </a:prstGeom>
         </p:spPr>
         <p:txBody>
-          <a:bodyPr lIns="0" rIns="0" tIns="0" bIns="0">
+          <a:bodyPr lIns="0" tIns="0" rIns="0" bIns="0">
             <a:normAutofit/>
           </a:bodyPr>
-          <a:p>
-            <a:endParaRPr b="0" lang="fr-FR" sz="3200" spc="-1" strike="noStrike">
+          <a:lstStyle/>
+          <a:p>
+            <a:endParaRPr lang="fr-FR" sz="3200" b="0" strike="noStrike" spc="-1">
               <a:latin typeface="Arial"/>
             </a:endParaRPr>
           </a:p>
@@ -705,11 +834,14 @@
       </p:sp>
     </p:spTree>
   </p:cSld>
+  <p:clrMapOvr>
+    <a:masterClrMapping/>
+  </p:clrMapOvr>
 </p:sldLayout>
 </file>
 
 <file path=ppt/slideLayouts/slideLayout4.xml><?xml version="1.0" encoding="utf-8"?>
-<p:sldLayout xmlns:a="http://schemas.openxmlformats.org/drawingml/2006/main" xmlns:p="http://schemas.openxmlformats.org/presentationml/2006/main" xmlns:r="http://schemas.openxmlformats.org/officeDocument/2006/relationships" xmlns:p14="http://schemas.microsoft.com/office/powerpoint/2010/main" xmlns:p15="http://schemas.microsoft.com/office/powerpoint/2012/main" xmlns:mc="http://schemas.openxmlformats.org/markup-compatibility/2006" type="twoObj" preserve="1">
+<p:sldLayout xmlns:a="http://schemas.openxmlformats.org/drawingml/2006/main" xmlns:r="http://schemas.openxmlformats.org/officeDocument/2006/relationships" xmlns:p="http://schemas.openxmlformats.org/presentationml/2006/main" type="twoObj" preserve="1">
   <p:cSld name="Title, 2 Content">
     <p:spTree>
       <p:nvGrpSpPr>
@@ -745,10 +877,11 @@
           </a:prstGeom>
         </p:spPr>
         <p:txBody>
-          <a:bodyPr lIns="0" rIns="0" tIns="0" bIns="0" anchor="ctr"/>
+          <a:bodyPr lIns="0" tIns="0" rIns="0" bIns="0" anchor="ctr"/>
+          <a:lstStyle/>
           <a:p>
             <a:pPr algn="ctr"/>
-            <a:endParaRPr b="0" lang="fr-FR" sz="4400" spc="-1" strike="noStrike">
+            <a:endParaRPr lang="fr-FR" sz="4400" b="0" strike="noStrike" spc="-1">
               <a:latin typeface="Arial"/>
             </a:endParaRPr>
           </a:p>
@@ -774,11 +907,12 @@
           </a:prstGeom>
         </p:spPr>
         <p:txBody>
-          <a:bodyPr lIns="0" rIns="0" tIns="0" bIns="0">
+          <a:bodyPr lIns="0" tIns="0" rIns="0" bIns="0">
             <a:normAutofit/>
           </a:bodyPr>
-          <a:p>
-            <a:endParaRPr b="0" lang="fr-FR" sz="3200" spc="-1" strike="noStrike">
+          <a:lstStyle/>
+          <a:p>
+            <a:endParaRPr lang="fr-FR" sz="3200" b="0" strike="noStrike" spc="-1">
               <a:latin typeface="Arial"/>
             </a:endParaRPr>
           </a:p>
@@ -804,11 +938,12 @@
           </a:prstGeom>
         </p:spPr>
         <p:txBody>
-          <a:bodyPr lIns="0" rIns="0" tIns="0" bIns="0">
+          <a:bodyPr lIns="0" tIns="0" rIns="0" bIns="0">
             <a:normAutofit/>
           </a:bodyPr>
-          <a:p>
-            <a:endParaRPr b="0" lang="fr-FR" sz="3200" spc="-1" strike="noStrike">
+          <a:lstStyle/>
+          <a:p>
+            <a:endParaRPr lang="fr-FR" sz="3200" b="0" strike="noStrike" spc="-1">
               <a:latin typeface="Arial"/>
             </a:endParaRPr>
           </a:p>
@@ -816,11 +951,14 @@
       </p:sp>
     </p:spTree>
   </p:cSld>
+  <p:clrMapOvr>
+    <a:masterClrMapping/>
+  </p:clrMapOvr>
 </p:sldLayout>
 </file>
 
 <file path=ppt/slideLayouts/slideLayout5.xml><?xml version="1.0" encoding="utf-8"?>
-<p:sldLayout xmlns:a="http://schemas.openxmlformats.org/drawingml/2006/main" xmlns:p="http://schemas.openxmlformats.org/presentationml/2006/main" xmlns:r="http://schemas.openxmlformats.org/officeDocument/2006/relationships" xmlns:p14="http://schemas.microsoft.com/office/powerpoint/2010/main" xmlns:p15="http://schemas.microsoft.com/office/powerpoint/2012/main" xmlns:mc="http://schemas.openxmlformats.org/markup-compatibility/2006" type="titleOnly" preserve="1">
+<p:sldLayout xmlns:a="http://schemas.openxmlformats.org/drawingml/2006/main" xmlns:r="http://schemas.openxmlformats.org/officeDocument/2006/relationships" xmlns:p="http://schemas.openxmlformats.org/presentationml/2006/main" type="titleOnly" preserve="1">
   <p:cSld name="Title Only">
     <p:spTree>
       <p:nvGrpSpPr>
@@ -856,10 +994,11 @@
           </a:prstGeom>
         </p:spPr>
         <p:txBody>
-          <a:bodyPr lIns="0" rIns="0" tIns="0" bIns="0" anchor="ctr"/>
+          <a:bodyPr lIns="0" tIns="0" rIns="0" bIns="0" anchor="ctr"/>
+          <a:lstStyle/>
           <a:p>
             <a:pPr algn="ctr"/>
-            <a:endParaRPr b="0" lang="fr-FR" sz="4400" spc="-1" strike="noStrike">
+            <a:endParaRPr lang="fr-FR" sz="4400" b="0" strike="noStrike" spc="-1">
               <a:latin typeface="Arial"/>
             </a:endParaRPr>
           </a:p>
@@ -867,11 +1006,14 @@
       </p:sp>
     </p:spTree>
   </p:cSld>
+  <p:clrMapOvr>
+    <a:masterClrMapping/>
+  </p:clrMapOvr>
 </p:sldLayout>
 </file>
 
 <file path=ppt/slideLayouts/slideLayout6.xml><?xml version="1.0" encoding="utf-8"?>
-<p:sldLayout xmlns:a="http://schemas.openxmlformats.org/drawingml/2006/main" xmlns:p="http://schemas.openxmlformats.org/presentationml/2006/main" xmlns:r="http://schemas.openxmlformats.org/officeDocument/2006/relationships" xmlns:p14="http://schemas.microsoft.com/office/powerpoint/2010/main" xmlns:p15="http://schemas.microsoft.com/office/powerpoint/2012/main" xmlns:mc="http://schemas.openxmlformats.org/markup-compatibility/2006" type="objOnly" preserve="1">
+<p:sldLayout xmlns:a="http://schemas.openxmlformats.org/drawingml/2006/main" xmlns:r="http://schemas.openxmlformats.org/officeDocument/2006/relationships" xmlns:p="http://schemas.openxmlformats.org/presentationml/2006/main" type="objOnly" preserve="1">
   <p:cSld name="Centered Text">
     <p:spTree>
       <p:nvGrpSpPr>
@@ -907,10 +1049,11 @@
           </a:prstGeom>
         </p:spPr>
         <p:txBody>
-          <a:bodyPr lIns="0" rIns="0" tIns="0" bIns="0" anchor="ctr"/>
+          <a:bodyPr lIns="0" tIns="0" rIns="0" bIns="0" anchor="ctr"/>
+          <a:lstStyle/>
           <a:p>
             <a:pPr algn="ctr"/>
-            <a:endParaRPr b="0" lang="fr-FR" sz="3200" spc="-1" strike="noStrike">
+            <a:endParaRPr lang="fr-FR" sz="3200" b="0" strike="noStrike" spc="-1">
               <a:latin typeface="Arial"/>
             </a:endParaRPr>
           </a:p>
@@ -918,11 +1061,14 @@
       </p:sp>
     </p:spTree>
   </p:cSld>
+  <p:clrMapOvr>
+    <a:masterClrMapping/>
+  </p:clrMapOvr>
 </p:sldLayout>
 </file>
 
 <file path=ppt/slideLayouts/slideLayout7.xml><?xml version="1.0" encoding="utf-8"?>
-<p:sldLayout xmlns:a="http://schemas.openxmlformats.org/drawingml/2006/main" xmlns:p="http://schemas.openxmlformats.org/presentationml/2006/main" xmlns:r="http://schemas.openxmlformats.org/officeDocument/2006/relationships" xmlns:p14="http://schemas.microsoft.com/office/powerpoint/2010/main" xmlns:p15="http://schemas.microsoft.com/office/powerpoint/2012/main" xmlns:mc="http://schemas.openxmlformats.org/markup-compatibility/2006" type="twoObjAndObj" preserve="1">
+<p:sldLayout xmlns:a="http://schemas.openxmlformats.org/drawingml/2006/main" xmlns:r="http://schemas.openxmlformats.org/officeDocument/2006/relationships" xmlns:p="http://schemas.openxmlformats.org/presentationml/2006/main" type="twoObjAndObj" preserve="1">
   <p:cSld name="Title, 2 Content and Content">
     <p:spTree>
       <p:nvGrpSpPr>
@@ -958,10 +1104,11 @@
           </a:prstGeom>
         </p:spPr>
         <p:txBody>
-          <a:bodyPr lIns="0" rIns="0" tIns="0" bIns="0" anchor="ctr"/>
+          <a:bodyPr lIns="0" tIns="0" rIns="0" bIns="0" anchor="ctr"/>
+          <a:lstStyle/>
           <a:p>
             <a:pPr algn="ctr"/>
-            <a:endParaRPr b="0" lang="fr-FR" sz="4400" spc="-1" strike="noStrike">
+            <a:endParaRPr lang="fr-FR" sz="4400" b="0" strike="noStrike" spc="-1">
               <a:latin typeface="Arial"/>
             </a:endParaRPr>
           </a:p>
@@ -987,11 +1134,12 @@
           </a:prstGeom>
         </p:spPr>
         <p:txBody>
-          <a:bodyPr lIns="0" rIns="0" tIns="0" bIns="0">
+          <a:bodyPr lIns="0" tIns="0" rIns="0" bIns="0">
             <a:normAutofit/>
           </a:bodyPr>
-          <a:p>
-            <a:endParaRPr b="0" lang="fr-FR" sz="3200" spc="-1" strike="noStrike">
+          <a:lstStyle/>
+          <a:p>
+            <a:endParaRPr lang="fr-FR" sz="3200" b="0" strike="noStrike" spc="-1">
               <a:latin typeface="Arial"/>
             </a:endParaRPr>
           </a:p>
@@ -1017,11 +1165,12 @@
           </a:prstGeom>
         </p:spPr>
         <p:txBody>
-          <a:bodyPr lIns="0" rIns="0" tIns="0" bIns="0">
+          <a:bodyPr lIns="0" tIns="0" rIns="0" bIns="0">
             <a:normAutofit/>
           </a:bodyPr>
-          <a:p>
-            <a:endParaRPr b="0" lang="fr-FR" sz="3200" spc="-1" strike="noStrike">
+          <a:lstStyle/>
+          <a:p>
+            <a:endParaRPr lang="fr-FR" sz="3200" b="0" strike="noStrike" spc="-1">
               <a:latin typeface="Arial"/>
             </a:endParaRPr>
           </a:p>
@@ -1047,11 +1196,12 @@
           </a:prstGeom>
         </p:spPr>
         <p:txBody>
-          <a:bodyPr lIns="0" rIns="0" tIns="0" bIns="0">
+          <a:bodyPr lIns="0" tIns="0" rIns="0" bIns="0">
             <a:normAutofit/>
           </a:bodyPr>
-          <a:p>
-            <a:endParaRPr b="0" lang="fr-FR" sz="3200" spc="-1" strike="noStrike">
+          <a:lstStyle/>
+          <a:p>
+            <a:endParaRPr lang="fr-FR" sz="3200" b="0" strike="noStrike" spc="-1">
               <a:latin typeface="Arial"/>
             </a:endParaRPr>
           </a:p>
@@ -1059,11 +1209,14 @@
       </p:sp>
     </p:spTree>
   </p:cSld>
+  <p:clrMapOvr>
+    <a:masterClrMapping/>
+  </p:clrMapOvr>
 </p:sldLayout>
 </file>
 
 <file path=ppt/slideLayouts/slideLayout8.xml><?xml version="1.0" encoding="utf-8"?>
-<p:sldLayout xmlns:a="http://schemas.openxmlformats.org/drawingml/2006/main" xmlns:p="http://schemas.openxmlformats.org/presentationml/2006/main" xmlns:r="http://schemas.openxmlformats.org/officeDocument/2006/relationships" xmlns:p14="http://schemas.microsoft.com/office/powerpoint/2010/main" xmlns:p15="http://schemas.microsoft.com/office/powerpoint/2012/main" xmlns:mc="http://schemas.openxmlformats.org/markup-compatibility/2006" type="objAndTwoObj" preserve="1">
+<p:sldLayout xmlns:a="http://schemas.openxmlformats.org/drawingml/2006/main" xmlns:r="http://schemas.openxmlformats.org/officeDocument/2006/relationships" xmlns:p="http://schemas.openxmlformats.org/presentationml/2006/main" type="objAndTwoObj" preserve="1">
   <p:cSld name="Title Content and 2 Content">
     <p:spTree>
       <p:nvGrpSpPr>
@@ -1099,10 +1252,11 @@
           </a:prstGeom>
         </p:spPr>
         <p:txBody>
-          <a:bodyPr lIns="0" rIns="0" tIns="0" bIns="0" anchor="ctr"/>
+          <a:bodyPr lIns="0" tIns="0" rIns="0" bIns="0" anchor="ctr"/>
+          <a:lstStyle/>
           <a:p>
             <a:pPr algn="ctr"/>
-            <a:endParaRPr b="0" lang="fr-FR" sz="4400" spc="-1" strike="noStrike">
+            <a:endParaRPr lang="fr-FR" sz="4400" b="0" strike="noStrike" spc="-1">
               <a:latin typeface="Arial"/>
             </a:endParaRPr>
           </a:p>
@@ -1128,11 +1282,12 @@
           </a:prstGeom>
         </p:spPr>
         <p:txBody>
-          <a:bodyPr lIns="0" rIns="0" tIns="0" bIns="0">
+          <a:bodyPr lIns="0" tIns="0" rIns="0" bIns="0">
             <a:normAutofit/>
           </a:bodyPr>
-          <a:p>
-            <a:endParaRPr b="0" lang="fr-FR" sz="3200" spc="-1" strike="noStrike">
+          <a:lstStyle/>
+          <a:p>
+            <a:endParaRPr lang="fr-FR" sz="3200" b="0" strike="noStrike" spc="-1">
               <a:latin typeface="Arial"/>
             </a:endParaRPr>
           </a:p>
@@ -1158,11 +1313,12 @@
           </a:prstGeom>
         </p:spPr>
         <p:txBody>
-          <a:bodyPr lIns="0" rIns="0" tIns="0" bIns="0">
+          <a:bodyPr lIns="0" tIns="0" rIns="0" bIns="0">
             <a:normAutofit/>
           </a:bodyPr>
-          <a:p>
-            <a:endParaRPr b="0" lang="fr-FR" sz="3200" spc="-1" strike="noStrike">
+          <a:lstStyle/>
+          <a:p>
+            <a:endParaRPr lang="fr-FR" sz="3200" b="0" strike="noStrike" spc="-1">
               <a:latin typeface="Arial"/>
             </a:endParaRPr>
           </a:p>
@@ -1188,11 +1344,12 @@
           </a:prstGeom>
         </p:spPr>
         <p:txBody>
-          <a:bodyPr lIns="0" rIns="0" tIns="0" bIns="0">
+          <a:bodyPr lIns="0" tIns="0" rIns="0" bIns="0">
             <a:normAutofit/>
           </a:bodyPr>
-          <a:p>
-            <a:endParaRPr b="0" lang="fr-FR" sz="3200" spc="-1" strike="noStrike">
+          <a:lstStyle/>
+          <a:p>
+            <a:endParaRPr lang="fr-FR" sz="3200" b="0" strike="noStrike" spc="-1">
               <a:latin typeface="Arial"/>
             </a:endParaRPr>
           </a:p>
@@ -1200,11 +1357,14 @@
       </p:sp>
     </p:spTree>
   </p:cSld>
+  <p:clrMapOvr>
+    <a:masterClrMapping/>
+  </p:clrMapOvr>
 </p:sldLayout>
 </file>
 
 <file path=ppt/slideLayouts/slideLayout9.xml><?xml version="1.0" encoding="utf-8"?>
-<p:sldLayout xmlns:a="http://schemas.openxmlformats.org/drawingml/2006/main" xmlns:p="http://schemas.openxmlformats.org/presentationml/2006/main" xmlns:r="http://schemas.openxmlformats.org/officeDocument/2006/relationships" xmlns:p14="http://schemas.microsoft.com/office/powerpoint/2010/main" xmlns:p15="http://schemas.microsoft.com/office/powerpoint/2012/main" xmlns:mc="http://schemas.openxmlformats.org/markup-compatibility/2006" type="twoObjOverTx" preserve="1">
+<p:sldLayout xmlns:a="http://schemas.openxmlformats.org/drawingml/2006/main" xmlns:r="http://schemas.openxmlformats.org/officeDocument/2006/relationships" xmlns:p="http://schemas.openxmlformats.org/presentationml/2006/main" type="twoObjOverTx" preserve="1">
   <p:cSld name="Title, 2 Content over Content">
     <p:spTree>
       <p:nvGrpSpPr>
@@ -1240,10 +1400,11 @@
           </a:prstGeom>
         </p:spPr>
         <p:txBody>
-          <a:bodyPr lIns="0" rIns="0" tIns="0" bIns="0" anchor="ctr"/>
+          <a:bodyPr lIns="0" tIns="0" rIns="0" bIns="0" anchor="ctr"/>
+          <a:lstStyle/>
           <a:p>
             <a:pPr algn="ctr"/>
-            <a:endParaRPr b="0" lang="fr-FR" sz="4400" spc="-1" strike="noStrike">
+            <a:endParaRPr lang="fr-FR" sz="4400" b="0" strike="noStrike" spc="-1">
               <a:latin typeface="Arial"/>
             </a:endParaRPr>
           </a:p>
@@ -1269,11 +1430,12 @@
           </a:prstGeom>
         </p:spPr>
         <p:txBody>
-          <a:bodyPr lIns="0" rIns="0" tIns="0" bIns="0">
+          <a:bodyPr lIns="0" tIns="0" rIns="0" bIns="0">
             <a:normAutofit/>
           </a:bodyPr>
-          <a:p>
-            <a:endParaRPr b="0" lang="fr-FR" sz="3200" spc="-1" strike="noStrike">
+          <a:lstStyle/>
+          <a:p>
+            <a:endParaRPr lang="fr-FR" sz="3200" b="0" strike="noStrike" spc="-1">
               <a:latin typeface="Arial"/>
             </a:endParaRPr>
           </a:p>
@@ -1299,11 +1461,12 @@
           </a:prstGeom>
         </p:spPr>
         <p:txBody>
-          <a:bodyPr lIns="0" rIns="0" tIns="0" bIns="0">
+          <a:bodyPr lIns="0" tIns="0" rIns="0" bIns="0">
             <a:normAutofit/>
           </a:bodyPr>
-          <a:p>
-            <a:endParaRPr b="0" lang="fr-FR" sz="3200" spc="-1" strike="noStrike">
+          <a:lstStyle/>
+          <a:p>
+            <a:endParaRPr lang="fr-FR" sz="3200" b="0" strike="noStrike" spc="-1">
               <a:latin typeface="Arial"/>
             </a:endParaRPr>
           </a:p>
@@ -1329,11 +1492,12 @@
           </a:prstGeom>
         </p:spPr>
         <p:txBody>
-          <a:bodyPr lIns="0" rIns="0" tIns="0" bIns="0">
+          <a:bodyPr lIns="0" tIns="0" rIns="0" bIns="0">
             <a:normAutofit/>
           </a:bodyPr>
-          <a:p>
-            <a:endParaRPr b="0" lang="fr-FR" sz="3200" spc="-1" strike="noStrike">
+          <a:lstStyle/>
+          <a:p>
+            <a:endParaRPr lang="fr-FR" sz="3200" b="0" strike="noStrike" spc="-1">
               <a:latin typeface="Arial"/>
             </a:endParaRPr>
           </a:p>
@@ -1341,17 +1505,21 @@
       </p:sp>
     </p:spTree>
   </p:cSld>
+  <p:clrMapOvr>
+    <a:masterClrMapping/>
+  </p:clrMapOvr>
 </p:sldLayout>
 </file>
 
 <file path=ppt/slideMasters/slideMaster1.xml><?xml version="1.0" encoding="utf-8"?>
-<p:sldMaster xmlns:a="http://schemas.openxmlformats.org/drawingml/2006/main" xmlns:p="http://schemas.openxmlformats.org/presentationml/2006/main" xmlns:r="http://schemas.openxmlformats.org/officeDocument/2006/relationships" xmlns:p14="http://schemas.microsoft.com/office/powerpoint/2010/main" xmlns:p15="http://schemas.microsoft.com/office/powerpoint/2012/main" xmlns:mc="http://schemas.openxmlformats.org/markup-compatibility/2006">
+<p:sldMaster xmlns:a="http://schemas.openxmlformats.org/drawingml/2006/main" xmlns:r="http://schemas.openxmlformats.org/officeDocument/2006/relationships" xmlns:p="http://schemas.openxmlformats.org/presentationml/2006/main">
   <p:cSld>
     <p:bg>
       <p:bgPr>
         <a:solidFill>
-          <a:srgbClr val="ffffff"/>
+          <a:srgbClr val="FFFFFF"/>
         </a:solidFill>
+        <a:effectLst/>
       </p:bgPr>
     </p:bg>
     <p:spTree>
@@ -1370,7 +1538,7 @@
       </p:grpSpPr>
       <p:sp>
         <p:nvSpPr>
-          <p:cNvPr id="0" name="PlaceHolder 1"/>
+          <p:cNvPr id="2" name="PlaceHolder 1"/>
           <p:cNvSpPr>
             <a:spLocks noGrp="1"/>
           </p:cNvSpPr>
@@ -1388,23 +1556,21 @@
           </a:prstGeom>
         </p:spPr>
         <p:txBody>
-          <a:bodyPr lIns="0" rIns="0" tIns="0" bIns="0" anchor="ctr"/>
+          <a:bodyPr lIns="0" tIns="0" rIns="0" bIns="0" anchor="ctr"/>
+          <a:lstStyle/>
           <a:p>
             <a:r>
-              <a:rPr b="0" lang="fr-FR" sz="1800" spc="-1" strike="noStrike">
+              <a:rPr lang="fr-FR" sz="1800" b="0" strike="noStrike" spc="-1">
                 <a:latin typeface="Arial"/>
               </a:rPr>
               <a:t>Cliquez pour éditer le format du texte-titre</a:t>
             </a:r>
-            <a:endParaRPr b="0" lang="fr-FR" sz="1800" spc="-1" strike="noStrike">
-              <a:latin typeface="Arial"/>
-            </a:endParaRPr>
-          </a:p>
-        </p:txBody>
-      </p:sp>
-      <p:sp>
-        <p:nvSpPr>
-          <p:cNvPr id="1" name="PlaceHolder 2"/>
+          </a:p>
+        </p:txBody>
+      </p:sp>
+      <p:sp>
+        <p:nvSpPr>
+          <p:cNvPr id="3" name="PlaceHolder 2"/>
           <p:cNvSpPr>
             <a:spLocks noGrp="1"/>
           </p:cNvSpPr>
@@ -1422,9 +1588,10 @@
           </a:prstGeom>
         </p:spPr>
         <p:txBody>
-          <a:bodyPr lIns="0" rIns="0" tIns="0" bIns="0">
+          <a:bodyPr lIns="0" tIns="0" rIns="0" bIns="0">
             <a:normAutofit/>
           </a:bodyPr>
+          <a:lstStyle/>
           <a:p>
             <a:pPr marL="432000" indent="-324000">
               <a:spcBef>
@@ -1438,17 +1605,14 @@
               <a:buChar char=""/>
             </a:pPr>
             <a:r>
-              <a:rPr b="0" lang="fr-FR" sz="1800" spc="-1" strike="noStrike">
+              <a:rPr lang="fr-FR" sz="1800" b="0" strike="noStrike" spc="-1">
                 <a:latin typeface="Arial"/>
               </a:rPr>
               <a:t>Cliquez pour éditer le format du plan de texte</a:t>
             </a:r>
-            <a:endParaRPr b="0" lang="fr-FR" sz="1800" spc="-1" strike="noStrike">
-              <a:latin typeface="Arial"/>
-            </a:endParaRPr>
-          </a:p>
-          <a:p>
-            <a:pPr lvl="1" marL="864000" indent="-324000">
+          </a:p>
+          <a:p>
+            <a:pPr marL="864000" lvl="1" indent="-324000">
               <a:spcBef>
                 <a:spcPts val="1134"/>
               </a:spcBef>
@@ -1460,17 +1624,14 @@
               <a:buChar char=""/>
             </a:pPr>
             <a:r>
-              <a:rPr b="0" lang="fr-FR" sz="1800" spc="-1" strike="noStrike">
+              <a:rPr lang="fr-FR" sz="1800" b="0" strike="noStrike" spc="-1">
                 <a:latin typeface="Arial"/>
               </a:rPr>
               <a:t>Second niveau de plan</a:t>
             </a:r>
-            <a:endParaRPr b="0" lang="fr-FR" sz="1800" spc="-1" strike="noStrike">
-              <a:latin typeface="Arial"/>
-            </a:endParaRPr>
-          </a:p>
-          <a:p>
-            <a:pPr lvl="2" marL="1296000" indent="-288000">
+          </a:p>
+          <a:p>
+            <a:pPr marL="1296000" lvl="2" indent="-288000">
               <a:spcBef>
                 <a:spcPts val="850"/>
               </a:spcBef>
@@ -1482,17 +1643,14 @@
               <a:buChar char=""/>
             </a:pPr>
             <a:r>
-              <a:rPr b="0" lang="fr-FR" sz="1800" spc="-1" strike="noStrike">
+              <a:rPr lang="fr-FR" sz="1800" b="0" strike="noStrike" spc="-1">
                 <a:latin typeface="Arial"/>
               </a:rPr>
               <a:t>Troisième niveau de plan</a:t>
             </a:r>
-            <a:endParaRPr b="0" lang="fr-FR" sz="1800" spc="-1" strike="noStrike">
-              <a:latin typeface="Arial"/>
-            </a:endParaRPr>
-          </a:p>
-          <a:p>
-            <a:pPr lvl="3" marL="1728000" indent="-216000">
+          </a:p>
+          <a:p>
+            <a:pPr marL="1728000" lvl="3" indent="-216000">
               <a:spcBef>
                 <a:spcPts val="567"/>
               </a:spcBef>
@@ -1504,17 +1662,14 @@
               <a:buChar char=""/>
             </a:pPr>
             <a:r>
-              <a:rPr b="0" lang="fr-FR" sz="1800" spc="-1" strike="noStrike">
+              <a:rPr lang="fr-FR" sz="1800" b="0" strike="noStrike" spc="-1">
                 <a:latin typeface="Arial"/>
               </a:rPr>
               <a:t>Quatrième niveau de plan</a:t>
             </a:r>
-            <a:endParaRPr b="0" lang="fr-FR" sz="1800" spc="-1" strike="noStrike">
-              <a:latin typeface="Arial"/>
-            </a:endParaRPr>
-          </a:p>
-          <a:p>
-            <a:pPr lvl="4" marL="2160000" indent="-216000">
+          </a:p>
+          <a:p>
+            <a:pPr marL="2160000" lvl="4" indent="-216000">
               <a:spcBef>
                 <a:spcPts val="283"/>
               </a:spcBef>
@@ -1526,17 +1681,14 @@
               <a:buChar char=""/>
             </a:pPr>
             <a:r>
-              <a:rPr b="0" lang="fr-FR" sz="1800" spc="-1" strike="noStrike">
+              <a:rPr lang="fr-FR" sz="1800" b="0" strike="noStrike" spc="-1">
                 <a:latin typeface="Arial"/>
               </a:rPr>
               <a:t>Cinquième niveau de plan</a:t>
             </a:r>
-            <a:endParaRPr b="0" lang="fr-FR" sz="1800" spc="-1" strike="noStrike">
-              <a:latin typeface="Arial"/>
-            </a:endParaRPr>
-          </a:p>
-          <a:p>
-            <a:pPr lvl="5" marL="2592000" indent="-216000">
+          </a:p>
+          <a:p>
+            <a:pPr marL="2592000" lvl="5" indent="-216000">
               <a:spcBef>
                 <a:spcPts val="283"/>
               </a:spcBef>
@@ -1548,17 +1700,14 @@
               <a:buChar char=""/>
             </a:pPr>
             <a:r>
-              <a:rPr b="0" lang="fr-FR" sz="1800" spc="-1" strike="noStrike">
+              <a:rPr lang="fr-FR" sz="1800" b="0" strike="noStrike" spc="-1">
                 <a:latin typeface="Arial"/>
               </a:rPr>
               <a:t>Sixième niveau de plan</a:t>
             </a:r>
-            <a:endParaRPr b="0" lang="fr-FR" sz="1800" spc="-1" strike="noStrike">
-              <a:latin typeface="Arial"/>
-            </a:endParaRPr>
-          </a:p>
-          <a:p>
-            <a:pPr lvl="6" marL="3024000" indent="-216000">
+          </a:p>
+          <a:p>
+            <a:pPr marL="3024000" lvl="6" indent="-216000">
               <a:spcBef>
                 <a:spcPts val="283"/>
               </a:spcBef>
@@ -1570,39 +1719,316 @@
               <a:buChar char=""/>
             </a:pPr>
             <a:r>
-              <a:rPr b="0" lang="fr-FR" sz="1800" spc="-1" strike="noStrike">
+              <a:rPr lang="fr-FR" sz="1800" b="0" strike="noStrike" spc="-1">
                 <a:latin typeface="Arial"/>
               </a:rPr>
               <a:t>Septième niveau de plan</a:t>
             </a:r>
-            <a:endParaRPr b="0" lang="fr-FR" sz="1800" spc="-1" strike="noStrike">
-              <a:latin typeface="Arial"/>
-            </a:endParaRPr>
           </a:p>
         </p:txBody>
       </p:sp>
     </p:spTree>
   </p:cSld>
-  <p:clrMap bg1="lt1" bg2="lt2" tx1="dk1" tx2="dk2" accent1="accent1" accent2="accent2" accent3="accent3" accent4="accent4" accent5="accent5" accent6="accent6" hlink="hlink" folHlink="folHlink"/>
+  <p:clrMap bg1="lt1" tx1="dk1" bg2="lt2" tx2="dk2" accent1="accent1" accent2="accent2" accent3="accent3" accent4="accent4" accent5="accent5" accent6="accent6" hlink="hlink" folHlink="folHlink"/>
   <p:sldLayoutIdLst>
-    <p:sldLayoutId id="2147483649" r:id="rId2"/>
-    <p:sldLayoutId id="2147483650" r:id="rId3"/>
-    <p:sldLayoutId id="2147483651" r:id="rId4"/>
-    <p:sldLayoutId id="2147483652" r:id="rId5"/>
-    <p:sldLayoutId id="2147483653" r:id="rId6"/>
-    <p:sldLayoutId id="2147483654" r:id="rId7"/>
-    <p:sldLayoutId id="2147483655" r:id="rId8"/>
-    <p:sldLayoutId id="2147483656" r:id="rId9"/>
-    <p:sldLayoutId id="2147483657" r:id="rId10"/>
-    <p:sldLayoutId id="2147483658" r:id="rId11"/>
-    <p:sldLayoutId id="2147483659" r:id="rId12"/>
-    <p:sldLayoutId id="2147483660" r:id="rId13"/>
+    <p:sldLayoutId id="2147483649" r:id="rId1"/>
+    <p:sldLayoutId id="2147483650" r:id="rId2"/>
+    <p:sldLayoutId id="2147483651" r:id="rId3"/>
+    <p:sldLayoutId id="2147483652" r:id="rId4"/>
+    <p:sldLayoutId id="2147483653" r:id="rId5"/>
+    <p:sldLayoutId id="2147483654" r:id="rId6"/>
+    <p:sldLayoutId id="2147483655" r:id="rId7"/>
+    <p:sldLayoutId id="2147483656" r:id="rId8"/>
+    <p:sldLayoutId id="2147483657" r:id="rId9"/>
+    <p:sldLayoutId id="2147483658" r:id="rId10"/>
+    <p:sldLayoutId id="2147483659" r:id="rId11"/>
+    <p:sldLayoutId id="2147483660" r:id="rId12"/>
   </p:sldLayoutIdLst>
+  <p:txStyles>
+    <p:titleStyle>
+      <a:lvl1pPr algn="l" defTabSz="914400" rtl="0" eaLnBrk="1" latinLnBrk="0" hangingPunct="1">
+        <a:lnSpc>
+          <a:spcPct val="90000"/>
+        </a:lnSpc>
+        <a:spcBef>
+          <a:spcPct val="0"/>
+        </a:spcBef>
+        <a:buNone/>
+        <a:defRPr sz="4400" kern="1200">
+          <a:solidFill>
+            <a:schemeClr val="tx1"/>
+          </a:solidFill>
+          <a:latin typeface="+mj-lt"/>
+          <a:ea typeface="+mj-ea"/>
+          <a:cs typeface="+mj-cs"/>
+        </a:defRPr>
+      </a:lvl1pPr>
+    </p:titleStyle>
+    <p:bodyStyle>
+      <a:lvl1pPr marL="228600" indent="-228600" algn="l" defTabSz="914400" rtl="0" eaLnBrk="1" latinLnBrk="0" hangingPunct="1">
+        <a:lnSpc>
+          <a:spcPct val="90000"/>
+        </a:lnSpc>
+        <a:spcBef>
+          <a:spcPts val="1000"/>
+        </a:spcBef>
+        <a:buFont typeface="Arial" panose="020B0604020202020204" pitchFamily="34" charset="0"/>
+        <a:buChar char="•"/>
+        <a:defRPr sz="2800" kern="1200">
+          <a:solidFill>
+            <a:schemeClr val="tx1"/>
+          </a:solidFill>
+          <a:latin typeface="+mn-lt"/>
+          <a:ea typeface="+mn-ea"/>
+          <a:cs typeface="+mn-cs"/>
+        </a:defRPr>
+      </a:lvl1pPr>
+      <a:lvl2pPr marL="685800" indent="-228600" algn="l" defTabSz="914400" rtl="0" eaLnBrk="1" latinLnBrk="0" hangingPunct="1">
+        <a:lnSpc>
+          <a:spcPct val="90000"/>
+        </a:lnSpc>
+        <a:spcBef>
+          <a:spcPts val="500"/>
+        </a:spcBef>
+        <a:buFont typeface="Arial" panose="020B0604020202020204" pitchFamily="34" charset="0"/>
+        <a:buChar char="•"/>
+        <a:defRPr sz="2400" kern="1200">
+          <a:solidFill>
+            <a:schemeClr val="tx1"/>
+          </a:solidFill>
+          <a:latin typeface="+mn-lt"/>
+          <a:ea typeface="+mn-ea"/>
+          <a:cs typeface="+mn-cs"/>
+        </a:defRPr>
+      </a:lvl2pPr>
+      <a:lvl3pPr marL="1143000" indent="-228600" algn="l" defTabSz="914400" rtl="0" eaLnBrk="1" latinLnBrk="0" hangingPunct="1">
+        <a:lnSpc>
+          <a:spcPct val="90000"/>
+        </a:lnSpc>
+        <a:spcBef>
+          <a:spcPts val="500"/>
+        </a:spcBef>
+        <a:buFont typeface="Arial" panose="020B0604020202020204" pitchFamily="34" charset="0"/>
+        <a:buChar char="•"/>
+        <a:defRPr sz="2000" kern="1200">
+          <a:solidFill>
+            <a:schemeClr val="tx1"/>
+          </a:solidFill>
+          <a:latin typeface="+mn-lt"/>
+          <a:ea typeface="+mn-ea"/>
+          <a:cs typeface="+mn-cs"/>
+        </a:defRPr>
+      </a:lvl3pPr>
+      <a:lvl4pPr marL="1600200" indent="-228600" algn="l" defTabSz="914400" rtl="0" eaLnBrk="1" latinLnBrk="0" hangingPunct="1">
+        <a:lnSpc>
+          <a:spcPct val="90000"/>
+        </a:lnSpc>
+        <a:spcBef>
+          <a:spcPts val="500"/>
+        </a:spcBef>
+        <a:buFont typeface="Arial" panose="020B0604020202020204" pitchFamily="34" charset="0"/>
+        <a:buChar char="•"/>
+        <a:defRPr sz="1800" kern="1200">
+          <a:solidFill>
+            <a:schemeClr val="tx1"/>
+          </a:solidFill>
+          <a:latin typeface="+mn-lt"/>
+          <a:ea typeface="+mn-ea"/>
+          <a:cs typeface="+mn-cs"/>
+        </a:defRPr>
+      </a:lvl4pPr>
+      <a:lvl5pPr marL="2057400" indent="-228600" algn="l" defTabSz="914400" rtl="0" eaLnBrk="1" latinLnBrk="0" hangingPunct="1">
+        <a:lnSpc>
+          <a:spcPct val="90000"/>
+        </a:lnSpc>
+        <a:spcBef>
+          <a:spcPts val="500"/>
+        </a:spcBef>
+        <a:buFont typeface="Arial" panose="020B0604020202020204" pitchFamily="34" charset="0"/>
+        <a:buChar char="•"/>
+        <a:defRPr sz="1800" kern="1200">
+          <a:solidFill>
+            <a:schemeClr val="tx1"/>
+          </a:solidFill>
+          <a:latin typeface="+mn-lt"/>
+          <a:ea typeface="+mn-ea"/>
+          <a:cs typeface="+mn-cs"/>
+        </a:defRPr>
+      </a:lvl5pPr>
+      <a:lvl6pPr marL="2514600" indent="-228600" algn="l" defTabSz="914400" rtl="0" eaLnBrk="1" latinLnBrk="0" hangingPunct="1">
+        <a:lnSpc>
+          <a:spcPct val="90000"/>
+        </a:lnSpc>
+        <a:spcBef>
+          <a:spcPts val="500"/>
+        </a:spcBef>
+        <a:buFont typeface="Arial" panose="020B0604020202020204" pitchFamily="34" charset="0"/>
+        <a:buChar char="•"/>
+        <a:defRPr sz="1800" kern="1200">
+          <a:solidFill>
+            <a:schemeClr val="tx1"/>
+          </a:solidFill>
+          <a:latin typeface="+mn-lt"/>
+          <a:ea typeface="+mn-ea"/>
+          <a:cs typeface="+mn-cs"/>
+        </a:defRPr>
+      </a:lvl6pPr>
+      <a:lvl7pPr marL="2971800" indent="-228600" algn="l" defTabSz="914400" rtl="0" eaLnBrk="1" latinLnBrk="0" hangingPunct="1">
+        <a:lnSpc>
+          <a:spcPct val="90000"/>
+        </a:lnSpc>
+        <a:spcBef>
+          <a:spcPts val="500"/>
+        </a:spcBef>
+        <a:buFont typeface="Arial" panose="020B0604020202020204" pitchFamily="34" charset="0"/>
+        <a:buChar char="•"/>
+        <a:defRPr sz="1800" kern="1200">
+          <a:solidFill>
+            <a:schemeClr val="tx1"/>
+          </a:solidFill>
+          <a:latin typeface="+mn-lt"/>
+          <a:ea typeface="+mn-ea"/>
+          <a:cs typeface="+mn-cs"/>
+        </a:defRPr>
+      </a:lvl7pPr>
+      <a:lvl8pPr marL="3429000" indent="-228600" algn="l" defTabSz="914400" rtl="0" eaLnBrk="1" latinLnBrk="0" hangingPunct="1">
+        <a:lnSpc>
+          <a:spcPct val="90000"/>
+        </a:lnSpc>
+        <a:spcBef>
+          <a:spcPts val="500"/>
+        </a:spcBef>
+        <a:buFont typeface="Arial" panose="020B0604020202020204" pitchFamily="34" charset="0"/>
+        <a:buChar char="•"/>
+        <a:defRPr sz="1800" kern="1200">
+          <a:solidFill>
+            <a:schemeClr val="tx1"/>
+          </a:solidFill>
+          <a:latin typeface="+mn-lt"/>
+          <a:ea typeface="+mn-ea"/>
+          <a:cs typeface="+mn-cs"/>
+        </a:defRPr>
+      </a:lvl8pPr>
+      <a:lvl9pPr marL="3886200" indent="-228600" algn="l" defTabSz="914400" rtl="0" eaLnBrk="1" latinLnBrk="0" hangingPunct="1">
+        <a:lnSpc>
+          <a:spcPct val="90000"/>
+        </a:lnSpc>
+        <a:spcBef>
+          <a:spcPts val="500"/>
+        </a:spcBef>
+        <a:buFont typeface="Arial" panose="020B0604020202020204" pitchFamily="34" charset="0"/>
+        <a:buChar char="•"/>
+        <a:defRPr sz="1800" kern="1200">
+          <a:solidFill>
+            <a:schemeClr val="tx1"/>
+          </a:solidFill>
+          <a:latin typeface="+mn-lt"/>
+          <a:ea typeface="+mn-ea"/>
+          <a:cs typeface="+mn-cs"/>
+        </a:defRPr>
+      </a:lvl9pPr>
+    </p:bodyStyle>
+    <p:otherStyle>
+      <a:defPPr>
+        <a:defRPr lang="fr-FR"/>
+      </a:defPPr>
+      <a:lvl1pPr marL="0" algn="l" defTabSz="914400" rtl="0" eaLnBrk="1" latinLnBrk="0" hangingPunct="1">
+        <a:defRPr sz="1800" kern="1200">
+          <a:solidFill>
+            <a:schemeClr val="tx1"/>
+          </a:solidFill>
+          <a:latin typeface="+mn-lt"/>
+          <a:ea typeface="+mn-ea"/>
+          <a:cs typeface="+mn-cs"/>
+        </a:defRPr>
+      </a:lvl1pPr>
+      <a:lvl2pPr marL="457200" algn="l" defTabSz="914400" rtl="0" eaLnBrk="1" latinLnBrk="0" hangingPunct="1">
+        <a:defRPr sz="1800" kern="1200">
+          <a:solidFill>
+            <a:schemeClr val="tx1"/>
+          </a:solidFill>
+          <a:latin typeface="+mn-lt"/>
+          <a:ea typeface="+mn-ea"/>
+          <a:cs typeface="+mn-cs"/>
+        </a:defRPr>
+      </a:lvl2pPr>
+      <a:lvl3pPr marL="914400" algn="l" defTabSz="914400" rtl="0" eaLnBrk="1" latinLnBrk="0" hangingPunct="1">
+        <a:defRPr sz="1800" kern="1200">
+          <a:solidFill>
+            <a:schemeClr val="tx1"/>
+          </a:solidFill>
+          <a:latin typeface="+mn-lt"/>
+          <a:ea typeface="+mn-ea"/>
+          <a:cs typeface="+mn-cs"/>
+        </a:defRPr>
+      </a:lvl3pPr>
+      <a:lvl4pPr marL="1371600" algn="l" defTabSz="914400" rtl="0" eaLnBrk="1" latinLnBrk="0" hangingPunct="1">
+        <a:defRPr sz="1800" kern="1200">
+          <a:solidFill>
+            <a:schemeClr val="tx1"/>
+          </a:solidFill>
+          <a:latin typeface="+mn-lt"/>
+          <a:ea typeface="+mn-ea"/>
+          <a:cs typeface="+mn-cs"/>
+        </a:defRPr>
+      </a:lvl4pPr>
+      <a:lvl5pPr marL="1828800" algn="l" defTabSz="914400" rtl="0" eaLnBrk="1" latinLnBrk="0" hangingPunct="1">
+        <a:defRPr sz="1800" kern="1200">
+          <a:solidFill>
+            <a:schemeClr val="tx1"/>
+          </a:solidFill>
+          <a:latin typeface="+mn-lt"/>
+          <a:ea typeface="+mn-ea"/>
+          <a:cs typeface="+mn-cs"/>
+        </a:defRPr>
+      </a:lvl5pPr>
+      <a:lvl6pPr marL="2286000" algn="l" defTabSz="914400" rtl="0" eaLnBrk="1" latinLnBrk="0" hangingPunct="1">
+        <a:defRPr sz="1800" kern="1200">
+          <a:solidFill>
+            <a:schemeClr val="tx1"/>
+          </a:solidFill>
+          <a:latin typeface="+mn-lt"/>
+          <a:ea typeface="+mn-ea"/>
+          <a:cs typeface="+mn-cs"/>
+        </a:defRPr>
+      </a:lvl6pPr>
+      <a:lvl7pPr marL="2743200" algn="l" defTabSz="914400" rtl="0" eaLnBrk="1" latinLnBrk="0" hangingPunct="1">
+        <a:defRPr sz="1800" kern="1200">
+          <a:solidFill>
+            <a:schemeClr val="tx1"/>
+          </a:solidFill>
+          <a:latin typeface="+mn-lt"/>
+          <a:ea typeface="+mn-ea"/>
+          <a:cs typeface="+mn-cs"/>
+        </a:defRPr>
+      </a:lvl7pPr>
+      <a:lvl8pPr marL="3200400" algn="l" defTabSz="914400" rtl="0" eaLnBrk="1" latinLnBrk="0" hangingPunct="1">
+        <a:defRPr sz="1800" kern="1200">
+          <a:solidFill>
+            <a:schemeClr val="tx1"/>
+          </a:solidFill>
+          <a:latin typeface="+mn-lt"/>
+          <a:ea typeface="+mn-ea"/>
+          <a:cs typeface="+mn-cs"/>
+        </a:defRPr>
+      </a:lvl8pPr>
+      <a:lvl9pPr marL="3657600" algn="l" defTabSz="914400" rtl="0" eaLnBrk="1" latinLnBrk="0" hangingPunct="1">
+        <a:defRPr sz="1800" kern="1200">
+          <a:solidFill>
+            <a:schemeClr val="tx1"/>
+          </a:solidFill>
+          <a:latin typeface="+mn-lt"/>
+          <a:ea typeface="+mn-ea"/>
+          <a:cs typeface="+mn-cs"/>
+        </a:defRPr>
+      </a:lvl9pPr>
+    </p:otherStyle>
+  </p:txStyles>
 </p:sldMaster>
 </file>
 
 <file path=ppt/slides/slide1.xml><?xml version="1.0" encoding="utf-8"?>
-<p:sld xmlns:a="http://schemas.openxmlformats.org/drawingml/2006/main" xmlns:p="http://schemas.openxmlformats.org/presentationml/2006/main" xmlns:r="http://schemas.openxmlformats.org/officeDocument/2006/relationships" xmlns:p14="http://schemas.microsoft.com/office/powerpoint/2010/main" xmlns:p15="http://schemas.microsoft.com/office/powerpoint/2012/main" xmlns:mc="http://schemas.openxmlformats.org/markup-compatibility/2006">
+<p:sld xmlns:a="http://schemas.openxmlformats.org/drawingml/2006/main" xmlns:r="http://schemas.openxmlformats.org/officeDocument/2006/relationships" xmlns:p="http://schemas.openxmlformats.org/presentationml/2006/main">
   <p:cSld>
     <p:spTree>
       <p:nvGrpSpPr>
@@ -1655,7 +2081,8 @@
           <a:fontRef idx="minor"/>
         </p:style>
         <p:txBody>
-          <a:bodyPr lIns="90000" rIns="90000" tIns="45000" bIns="45000" anchor="ctr"/>
+          <a:bodyPr lIns="90000" tIns="45000" rIns="90000" bIns="45000" anchor="ctr"/>
+          <a:lstStyle/>
           <a:p>
             <a:pPr algn="ctr">
               <a:lnSpc>
@@ -1663,7 +2090,7 @@
               </a:lnSpc>
             </a:pPr>
             <a:r>
-              <a:rPr b="1" lang="fr-FR" sz="1800" spc="-1" strike="noStrike">
+              <a:rPr lang="fr-FR" sz="1800" b="1" strike="noStrike" spc="-1">
                 <a:solidFill>
                   <a:srgbClr val="000000"/>
                 </a:solidFill>
@@ -1673,7 +2100,7 @@
               <a:t>fonction</a:t>
             </a:r>
             <a:r>
-              <a:rPr b="0" lang="fr-FR" sz="1800" spc="-1" strike="noStrike">
+              <a:rPr lang="fr-FR" sz="1800" b="0" strike="noStrike" spc="-1">
                 <a:solidFill>
                   <a:srgbClr val="000000"/>
                 </a:solidFill>
@@ -1682,7 +2109,7 @@
               </a:rPr>
               <a:t>(…, …)</a:t>
             </a:r>
-            <a:endParaRPr b="0" lang="fr-FR" sz="1800" spc="-1" strike="noStrike">
+            <a:endParaRPr lang="fr-FR" sz="1800" b="0" strike="noStrike" spc="-1">
               <a:latin typeface="Arial"/>
             </a:endParaRPr>
           </a:p>
@@ -1725,7 +2152,8 @@
           <a:fontRef idx="minor"/>
         </p:style>
         <p:txBody>
-          <a:bodyPr lIns="90000" rIns="90000" tIns="45000" bIns="45000" anchor="ctr"/>
+          <a:bodyPr lIns="90000" tIns="45000" rIns="90000" bIns="45000" anchor="ctr"/>
+          <a:lstStyle/>
           <a:p>
             <a:pPr algn="ctr">
               <a:lnSpc>
@@ -1733,7 +2161,7 @@
               </a:lnSpc>
             </a:pPr>
             <a:r>
-              <a:rPr b="1" lang="fr-FR" sz="1800" spc="-1" strike="noStrike">
+              <a:rPr lang="fr-FR" sz="1800" b="1" strike="noStrike" spc="-1">
                 <a:solidFill>
                   <a:srgbClr val="000000"/>
                 </a:solidFill>
@@ -1742,7 +2170,7 @@
               </a:rPr>
               <a:t>programme principal</a:t>
             </a:r>
-            <a:endParaRPr b="0" lang="fr-FR" sz="1800" spc="-1" strike="noStrike">
+            <a:endParaRPr lang="fr-FR" sz="1800" b="0" strike="noStrike" spc="-1">
               <a:latin typeface="Arial"/>
             </a:endParaRPr>
           </a:p>
@@ -1768,13 +2196,20 @@
           </a:ln>
         </p:spPr>
         <p:style>
-          <a:lnRef idx="0"/>
-          <a:fillRef idx="0"/>
-          <a:effectRef idx="0"/>
+          <a:lnRef idx="0">
+            <a:scrgbClr r="0" g="0" b="0"/>
+          </a:lnRef>
+          <a:fillRef idx="0">
+            <a:scrgbClr r="0" g="0" b="0"/>
+          </a:fillRef>
+          <a:effectRef idx="0">
+            <a:scrgbClr r="0" g="0" b="0"/>
+          </a:effectRef>
           <a:fontRef idx="minor"/>
         </p:style>
         <p:txBody>
-          <a:bodyPr lIns="90000" rIns="90000" tIns="45000" bIns="45000"/>
+          <a:bodyPr lIns="90000" tIns="45000" rIns="90000" bIns="45000"/>
+          <a:lstStyle/>
           <a:p>
             <a:pPr>
               <a:lnSpc>
@@ -1782,16 +2217,16 @@
               </a:lnSpc>
             </a:pPr>
             <a:r>
-              <a:rPr b="0" lang="fr-FR" sz="1800" spc="-1" strike="noStrike">
+              <a:rPr lang="fr-FR" sz="1800" b="0" strike="noStrike" spc="-1" dirty="0">
                 <a:solidFill>
                   <a:srgbClr val="000000"/>
                 </a:solidFill>
                 <a:latin typeface="Arial"/>
                 <a:ea typeface="DejaVu Sans"/>
               </a:rPr>
-              <a:t>1) appel de la fonction : </a:t>
+              <a:t>1) Appel de la fonction : </a:t>
             </a:r>
-            <a:endParaRPr b="0" lang="fr-FR" sz="1800" spc="-1" strike="noStrike">
+            <a:endParaRPr lang="fr-FR" sz="1800" b="0" strike="noStrike" spc="-1" dirty="0">
               <a:latin typeface="Arial"/>
             </a:endParaRPr>
           </a:p>
@@ -1802,16 +2237,16 @@
               </a:lnSpc>
             </a:pPr>
             <a:r>
-              <a:rPr b="0" lang="fr-FR" sz="1800" spc="-1" strike="noStrike">
+              <a:rPr lang="fr-FR" sz="1800" b="0" strike="noStrike" spc="-1" dirty="0">
                 <a:solidFill>
                   <a:srgbClr val="000000"/>
                 </a:solidFill>
                 <a:latin typeface="Arial"/>
                 <a:ea typeface="DejaVu Sans"/>
               </a:rPr>
-              <a:t>passage de 0, 1, ou plusieurs argument(s)</a:t>
+              <a:t>passage de 0, 1 ou plusieurs argument(s)</a:t>
             </a:r>
-            <a:endParaRPr b="0" lang="fr-FR" sz="1800" spc="-1" strike="noStrike">
+            <a:endParaRPr lang="fr-FR" sz="1800" b="0" strike="noStrike" spc="-1" dirty="0">
               <a:latin typeface="Arial"/>
             </a:endParaRPr>
           </a:p>
@@ -1837,13 +2272,20 @@
           </a:ln>
         </p:spPr>
         <p:style>
-          <a:lnRef idx="0"/>
-          <a:fillRef idx="0"/>
-          <a:effectRef idx="0"/>
+          <a:lnRef idx="0">
+            <a:scrgbClr r="0" g="0" b="0"/>
+          </a:lnRef>
+          <a:fillRef idx="0">
+            <a:scrgbClr r="0" g="0" b="0"/>
+          </a:fillRef>
+          <a:effectRef idx="0">
+            <a:scrgbClr r="0" g="0" b="0"/>
+          </a:effectRef>
           <a:fontRef idx="minor"/>
         </p:style>
         <p:txBody>
-          <a:bodyPr lIns="90000" rIns="90000" tIns="45000" bIns="45000"/>
+          <a:bodyPr lIns="90000" tIns="45000" rIns="90000" bIns="45000"/>
+          <a:lstStyle/>
           <a:p>
             <a:pPr>
               <a:lnSpc>
@@ -1851,16 +2293,36 @@
               </a:lnSpc>
             </a:pPr>
             <a:r>
-              <a:rPr b="0" lang="fr-FR" sz="1800" spc="-1" strike="noStrike">
+              <a:rPr lang="fr-FR" sz="1800" b="0" strike="noStrike" spc="-1" dirty="0">
                 <a:solidFill>
                   <a:srgbClr val="000000"/>
                 </a:solidFill>
                 <a:latin typeface="Arial"/>
                 <a:ea typeface="DejaVu Sans"/>
               </a:rPr>
-              <a:t>3) renvoi d’un objet Python ou de rien du tout</a:t>
+              <a:t>3) </a:t>
             </a:r>
-            <a:endParaRPr b="0" lang="fr-FR" sz="1800" spc="-1" strike="noStrike">
+            <a:r>
+              <a:rPr lang="fr-FR" sz="1800" b="0" strike="noStrike" spc="-1" dirty="0" err="1">
+                <a:solidFill>
+                  <a:srgbClr val="000000"/>
+                </a:solidFill>
+                <a:latin typeface="Arial"/>
+                <a:ea typeface="DejaVu Sans"/>
+              </a:rPr>
+              <a:t>Rrenvoi</a:t>
+            </a:r>
+            <a:r>
+              <a:rPr lang="fr-FR" sz="1800" b="0" strike="noStrike" spc="-1" dirty="0">
+                <a:solidFill>
+                  <a:srgbClr val="000000"/>
+                </a:solidFill>
+                <a:latin typeface="Arial"/>
+                <a:ea typeface="DejaVu Sans"/>
+              </a:rPr>
+              <a:t> d’un objet Python ou de rien</a:t>
+            </a:r>
+            <a:endParaRPr lang="fr-FR" sz="1800" b="0" strike="noStrike" spc="-1" dirty="0">
               <a:latin typeface="Arial"/>
             </a:endParaRPr>
           </a:p>
@@ -1886,13 +2348,20 @@
           </a:ln>
         </p:spPr>
         <p:style>
-          <a:lnRef idx="0"/>
-          <a:fillRef idx="0"/>
-          <a:effectRef idx="0"/>
+          <a:lnRef idx="0">
+            <a:scrgbClr r="0" g="0" b="0"/>
+          </a:lnRef>
+          <a:fillRef idx="0">
+            <a:scrgbClr r="0" g="0" b="0"/>
+          </a:fillRef>
+          <a:effectRef idx="0">
+            <a:scrgbClr r="0" g="0" b="0"/>
+          </a:effectRef>
           <a:fontRef idx="minor"/>
         </p:style>
         <p:txBody>
-          <a:bodyPr lIns="90000" rIns="90000" tIns="45000" bIns="45000"/>
+          <a:bodyPr lIns="90000" tIns="45000" rIns="90000" bIns="45000"/>
+          <a:lstStyle/>
           <a:p>
             <a:pPr algn="ctr">
               <a:lnSpc>
@@ -1900,16 +2369,16 @@
               </a:lnSpc>
             </a:pPr>
             <a:r>
-              <a:rPr b="0" lang="fr-FR" sz="1800" spc="-1" strike="noStrike">
+              <a:rPr lang="fr-FR" sz="1800" b="0" strike="noStrike" spc="-1" dirty="0">
                 <a:solidFill>
                   <a:srgbClr val="000000"/>
                 </a:solidFill>
                 <a:latin typeface="Arial"/>
                 <a:ea typeface="DejaVu Sans"/>
               </a:rPr>
-              <a:t>2) action effectuée</a:t>
+              <a:t>2) Action effectuée</a:t>
             </a:r>
-            <a:endParaRPr b="0" lang="fr-FR" sz="1800" spc="-1" strike="noStrike">
+            <a:endParaRPr lang="fr-FR" sz="1800" b="0" strike="noStrike" spc="-1" dirty="0">
               <a:latin typeface="Arial"/>
             </a:endParaRPr>
           </a:p>
@@ -1934,7 +2403,7 @@
               <a:srgbClr val="000000"/>
             </a:solidFill>
             <a:round/>
-            <a:tailEnd len="med" type="triangle" w="med"/>
+            <a:tailEnd type="triangle" w="med" len="med"/>
           </a:ln>
         </p:spPr>
       </p:cxnSp>
@@ -1957,12 +2426,111 @@
               <a:srgbClr val="000000"/>
             </a:solidFill>
             <a:round/>
-            <a:tailEnd len="med" type="triangle" w="med"/>
+            <a:tailEnd type="triangle" w="med" len="med"/>
           </a:ln>
         </p:spPr>
+      </p:cxnSp>
+      <p:cxnSp>
+        <p:nvCxnSpPr>
+          <p:cNvPr id="3" name="Connecteur : en angle 2">
+            <a:extLst>
+              <a:ext uri="{FF2B5EF4-FFF2-40B4-BE49-F238E27FC236}">
+                <a16:creationId xmlns:a16="http://schemas.microsoft.com/office/drawing/2014/main" id="{8DBF0F2B-C9C4-4EBE-83F0-F59E8D3FDA27}"/>
+              </a:ext>
+            </a:extLst>
+          </p:cNvPr>
+          <p:cNvCxnSpPr>
+            <a:cxnSpLocks/>
+            <a:stCxn id="39" idx="1"/>
+            <a:endCxn id="38" idx="1"/>
+          </p:cNvCxnSpPr>
+          <p:nvPr/>
+        </p:nvCxnSpPr>
+        <p:spPr>
+          <a:xfrm rot="10800000">
+            <a:off x="3336120" y="2126880"/>
+            <a:ext cx="12700" cy="1937520"/>
+          </a:xfrm>
+          <a:prstGeom prst="bentConnector3">
+            <a:avLst>
+              <a:gd name="adj1" fmla="val 3966992"/>
+            </a:avLst>
+          </a:prstGeom>
+          <a:ln w="25400">
+            <a:solidFill>
+              <a:schemeClr val="tx1"/>
+            </a:solidFill>
+            <a:tailEnd type="triangle"/>
+          </a:ln>
+        </p:spPr>
+        <p:style>
+          <a:lnRef idx="1">
+            <a:schemeClr val="accent1"/>
+          </a:lnRef>
+          <a:fillRef idx="0">
+            <a:schemeClr val="accent1"/>
+          </a:fillRef>
+          <a:effectRef idx="0">
+            <a:schemeClr val="accent1"/>
+          </a:effectRef>
+          <a:fontRef idx="minor">
+            <a:schemeClr val="tx1"/>
+          </a:fontRef>
+        </p:style>
+      </p:cxnSp>
+      <p:cxnSp>
+        <p:nvCxnSpPr>
+          <p:cNvPr id="10" name="Connecteur : en angle 9">
+            <a:extLst>
+              <a:ext uri="{FF2B5EF4-FFF2-40B4-BE49-F238E27FC236}">
+                <a16:creationId xmlns:a16="http://schemas.microsoft.com/office/drawing/2014/main" id="{9752526E-FDB9-436A-B514-E6F256AECEDD}"/>
+              </a:ext>
+            </a:extLst>
+          </p:cNvPr>
+          <p:cNvCxnSpPr>
+            <a:cxnSpLocks/>
+            <a:stCxn id="38" idx="3"/>
+            <a:endCxn id="39" idx="3"/>
+          </p:cNvCxnSpPr>
+          <p:nvPr/>
+        </p:nvCxnSpPr>
+        <p:spPr>
+          <a:xfrm>
+            <a:off x="5692320" y="2126880"/>
+            <a:ext cx="12700" cy="1937520"/>
+          </a:xfrm>
+          <a:prstGeom prst="bentConnector3">
+            <a:avLst>
+              <a:gd name="adj1" fmla="val 3407764"/>
+            </a:avLst>
+          </a:prstGeom>
+          <a:ln w="25400">
+            <a:solidFill>
+              <a:schemeClr val="tx1"/>
+            </a:solidFill>
+            <a:tailEnd type="triangle"/>
+          </a:ln>
+        </p:spPr>
+        <p:style>
+          <a:lnRef idx="1">
+            <a:schemeClr val="accent1"/>
+          </a:lnRef>
+          <a:fillRef idx="0">
+            <a:schemeClr val="accent1"/>
+          </a:fillRef>
+          <a:effectRef idx="0">
+            <a:schemeClr val="accent1"/>
+          </a:effectRef>
+          <a:fontRef idx="minor">
+            <a:schemeClr val="tx1"/>
+          </a:fontRef>
+        </p:style>
       </p:cxnSp>
     </p:spTree>
   </p:cSld>
+  <p:clrMapOvr>
+    <a:masterClrMapping/>
+  </p:clrMapOvr>
   <p:timing>
     <p:tnLst>
       <p:par>
@@ -1971,14 +2539,14 @@
             <p:seq>
               <p:cTn id="2" dur="indefinite" nodeType="mainSeq"/>
               <p:prevCondLst>
-                <p:cond delay="0" evt="onPrev">
+                <p:cond evt="onPrev" delay="0">
                   <p:tgtEl>
                     <p:sldTgt/>
                   </p:tgtEl>
                 </p:cond>
               </p:prevCondLst>
               <p:nextCondLst>
-                <p:cond delay="0" evt="onNext">
+                <p:cond evt="onNext" delay="0">
                   <p:tgtEl>
                     <p:sldTgt/>
                   </p:tgtEl>
@@ -2004,31 +2572,31 @@
         <a:sysClr val="window" lastClr="FFFFFF"/>
       </a:lt1>
       <a:dk2>
-        <a:srgbClr val="1f497d"/>
+        <a:srgbClr val="1F497D"/>
       </a:dk2>
       <a:lt2>
-        <a:srgbClr val="eeece1"/>
+        <a:srgbClr val="EEECE1"/>
       </a:lt2>
       <a:accent1>
-        <a:srgbClr val="4f81bd"/>
+        <a:srgbClr val="4F81BD"/>
       </a:accent1>
       <a:accent2>
-        <a:srgbClr val="c0504d"/>
+        <a:srgbClr val="C0504D"/>
       </a:accent2>
       <a:accent3>
-        <a:srgbClr val="9bbb59"/>
+        <a:srgbClr val="9BBB59"/>
       </a:accent3>
       <a:accent4>
-        <a:srgbClr val="8064a2"/>
+        <a:srgbClr val="8064A2"/>
       </a:accent4>
       <a:accent5>
-        <a:srgbClr val="4bacc6"/>
+        <a:srgbClr val="4BACC6"/>
       </a:accent5>
       <a:accent6>
-        <a:srgbClr val="f79646"/>
+        <a:srgbClr val="F79646"/>
       </a:accent6>
       <a:hlink>
-        <a:srgbClr val="0000ff"/>
+        <a:srgbClr val="0000FF"/>
       </a:hlink>
       <a:folHlink>
         <a:srgbClr val="800080"/>
@@ -2213,5 +2781,7 @@
       </a:bgFillStyleLst>
     </a:fmtScheme>
   </a:themeElements>
+  <a:objectDefaults/>
+  <a:extraClrSchemeLst/>
 </a:theme>
 </file>
</xml_diff>